<commit_message>
made some changes in the ppt
</commit_message>
<xml_diff>
--- a/AngularJS.pptx
+++ b/AngularJS.pptx
@@ -8625,7 +8625,11 @@
           <a:p>
             <a:r>
               <a:rPr lang="en-US" dirty="0" smtClean="0"/>
-              <a:t> Separate your Concerns</a:t>
+              <a:t>Separate </a:t>
+            </a:r>
+            <a:r>
+              <a:rPr lang="en-US" dirty="0" smtClean="0"/>
+              <a:t>your Concerns</a:t>
             </a:r>
           </a:p>
           <a:p>
@@ -8637,13 +8641,8 @@
           <a:p>
             <a:r>
               <a:rPr lang="en-US" dirty="0" smtClean="0"/>
-              <a:t>Extensible : Ability to create new </a:t>
-            </a:r>
-            <a:r>
-              <a:rPr lang="en-US" smtClean="0"/>
-              <a:t>custom directives</a:t>
-            </a:r>
-            <a:endParaRPr lang="en-US" dirty="0" smtClean="0"/>
+              <a:t>Extensible : Ability to create new custom directives</a:t>
+            </a:r>
           </a:p>
           <a:p>
             <a:r>

</xml_diff>

<commit_message>
added modules section in the ppt
</commit_message>
<xml_diff>
--- a/AngularJS.pptx
+++ b/AngularJS.pptx
@@ -9,6 +9,7 @@
     <p:sldId id="257" r:id="rId3"/>
     <p:sldId id="258" r:id="rId4"/>
     <p:sldId id="259" r:id="rId5"/>
+    <p:sldId id="260" r:id="rId6"/>
   </p:sldIdLst>
   <p:sldSz cx="12192000" cy="6858000"/>
   <p:notesSz cx="6858000" cy="9144000"/>
@@ -120,6 +121,7 @@
           <p14:sldIdLst>
             <p14:sldId id="258"/>
             <p14:sldId id="259"/>
+            <p14:sldId id="260"/>
           </p14:sldIdLst>
         </p14:section>
       </p14:sectionLst>
@@ -320,7 +322,7 @@
             <a:fld id="{B61BEF0D-F0BB-DE4B-95CE-6DB70DBA9567}" type="datetimeFigureOut">
               <a:rPr lang="en-US" dirty="0"/>
               <a:pPr/>
-              <a:t>12/27/2015</a:t>
+              <a:t>12/28/2015</a:t>
             </a:fld>
             <a:endParaRPr lang="en-US" dirty="0"/>
           </a:p>
@@ -655,7 +657,7 @@
             <a:fld id="{B61BEF0D-F0BB-DE4B-95CE-6DB70DBA9567}" type="datetimeFigureOut">
               <a:rPr lang="en-US" dirty="0"/>
               <a:pPr/>
-              <a:t>12/27/2015</a:t>
+              <a:t>12/28/2015</a:t>
             </a:fld>
             <a:endParaRPr lang="en-US" dirty="0"/>
           </a:p>
@@ -1053,7 +1055,7 @@
             <a:fld id="{B61BEF0D-F0BB-DE4B-95CE-6DB70DBA9567}" type="datetimeFigureOut">
               <a:rPr lang="en-US" dirty="0"/>
               <a:pPr/>
-              <a:t>12/27/2015</a:t>
+              <a:t>12/28/2015</a:t>
             </a:fld>
             <a:endParaRPr lang="en-US" dirty="0"/>
           </a:p>
@@ -1386,7 +1388,7 @@
             <a:fld id="{B61BEF0D-F0BB-DE4B-95CE-6DB70DBA9567}" type="datetimeFigureOut">
               <a:rPr lang="en-US" dirty="0"/>
               <a:pPr/>
-              <a:t>12/27/2015</a:t>
+              <a:t>12/28/2015</a:t>
             </a:fld>
             <a:endParaRPr lang="en-US" dirty="0"/>
           </a:p>
@@ -1703,7 +1705,7 @@
             <a:fld id="{B61BEF0D-F0BB-DE4B-95CE-6DB70DBA9567}" type="datetimeFigureOut">
               <a:rPr lang="en-US" dirty="0"/>
               <a:pPr/>
-              <a:t>12/27/2015</a:t>
+              <a:t>12/28/2015</a:t>
             </a:fld>
             <a:endParaRPr lang="en-US" dirty="0"/>
           </a:p>
@@ -2096,7 +2098,7 @@
             <a:fld id="{B61BEF0D-F0BB-DE4B-95CE-6DB70DBA9567}" type="datetimeFigureOut">
               <a:rPr lang="en-US" dirty="0"/>
               <a:pPr/>
-              <a:t>12/27/2015</a:t>
+              <a:t>12/28/2015</a:t>
             </a:fld>
             <a:endParaRPr lang="en-US" dirty="0"/>
           </a:p>
@@ -2350,7 +2352,7 @@
             <a:fld id="{B61BEF0D-F0BB-DE4B-95CE-6DB70DBA9567}" type="datetimeFigureOut">
               <a:rPr lang="en-US" dirty="0"/>
               <a:pPr/>
-              <a:t>12/27/2015</a:t>
+              <a:t>12/28/2015</a:t>
             </a:fld>
             <a:endParaRPr lang="en-US" dirty="0"/>
           </a:p>
@@ -2609,7 +2611,7 @@
             <a:fld id="{B61BEF0D-F0BB-DE4B-95CE-6DB70DBA9567}" type="datetimeFigureOut">
               <a:rPr lang="en-US" dirty="0"/>
               <a:pPr/>
-              <a:t>12/27/2015</a:t>
+              <a:t>12/28/2015</a:t>
             </a:fld>
             <a:endParaRPr lang="en-US" dirty="0"/>
           </a:p>
@@ -2868,7 +2870,7 @@
             <a:fld id="{B61BEF0D-F0BB-DE4B-95CE-6DB70DBA9567}" type="datetimeFigureOut">
               <a:rPr lang="en-US" dirty="0"/>
               <a:pPr/>
-              <a:t>12/27/2015</a:t>
+              <a:t>12/28/2015</a:t>
             </a:fld>
             <a:endParaRPr lang="en-US" dirty="0"/>
           </a:p>
@@ -3194,7 +3196,7 @@
             <a:fld id="{B61BEF0D-F0BB-DE4B-95CE-6DB70DBA9567}" type="datetimeFigureOut">
               <a:rPr lang="en-US" dirty="0"/>
               <a:pPr/>
-              <a:t>12/27/2015</a:t>
+              <a:t>12/28/2015</a:t>
             </a:fld>
             <a:endParaRPr lang="en-US" dirty="0"/>
           </a:p>
@@ -3514,7 +3516,7 @@
             <a:fld id="{B61BEF0D-F0BB-DE4B-95CE-6DB70DBA9567}" type="datetimeFigureOut">
               <a:rPr lang="en-US" dirty="0"/>
               <a:pPr/>
-              <a:t>12/27/2015</a:t>
+              <a:t>12/28/2015</a:t>
             </a:fld>
             <a:endParaRPr lang="en-US" dirty="0"/>
           </a:p>
@@ -3968,7 +3970,7 @@
             <a:fld id="{B61BEF0D-F0BB-DE4B-95CE-6DB70DBA9567}" type="datetimeFigureOut">
               <a:rPr lang="en-US" dirty="0"/>
               <a:pPr/>
-              <a:t>12/27/2015</a:t>
+              <a:t>12/28/2015</a:t>
             </a:fld>
             <a:endParaRPr lang="en-US" dirty="0"/>
           </a:p>
@@ -4170,7 +4172,7 @@
             <a:fld id="{B61BEF0D-F0BB-DE4B-95CE-6DB70DBA9567}" type="datetimeFigureOut">
               <a:rPr lang="en-US" dirty="0"/>
               <a:pPr/>
-              <a:t>12/27/2015</a:t>
+              <a:t>12/28/2015</a:t>
             </a:fld>
             <a:endParaRPr lang="en-US" dirty="0"/>
           </a:p>
@@ -4344,7 +4346,7 @@
             <a:fld id="{B61BEF0D-F0BB-DE4B-95CE-6DB70DBA9567}" type="datetimeFigureOut">
               <a:rPr lang="en-US" dirty="0"/>
               <a:pPr/>
-              <a:t>12/27/2015</a:t>
+              <a:t>12/28/2015</a:t>
             </a:fld>
             <a:endParaRPr lang="en-US" dirty="0"/>
           </a:p>
@@ -4674,7 +4676,7 @@
             <a:fld id="{B61BEF0D-F0BB-DE4B-95CE-6DB70DBA9567}" type="datetimeFigureOut">
               <a:rPr lang="en-US" dirty="0"/>
               <a:pPr/>
-              <a:t>12/27/2015</a:t>
+              <a:t>12/28/2015</a:t>
             </a:fld>
             <a:endParaRPr lang="en-US" dirty="0"/>
           </a:p>
@@ -5016,7 +5018,7 @@
             <a:fld id="{B61BEF0D-F0BB-DE4B-95CE-6DB70DBA9567}" type="datetimeFigureOut">
               <a:rPr lang="en-US" dirty="0"/>
               <a:pPr/>
-              <a:t>12/27/2015</a:t>
+              <a:t>12/28/2015</a:t>
             </a:fld>
             <a:endParaRPr lang="en-US" dirty="0"/>
           </a:p>
@@ -7130,7 +7132,7 @@
             <a:fld id="{B61BEF0D-F0BB-DE4B-95CE-6DB70DBA9567}" type="datetimeFigureOut">
               <a:rPr lang="en-US" dirty="0"/>
               <a:pPr/>
-              <a:t>12/27/2015</a:t>
+              <a:t>12/28/2015</a:t>
             </a:fld>
             <a:endParaRPr lang="en-US" dirty="0"/>
           </a:p>
@@ -8625,11 +8627,7 @@
           <a:p>
             <a:r>
               <a:rPr lang="en-US" dirty="0" smtClean="0"/>
-              <a:t>Separate </a:t>
-            </a:r>
-            <a:r>
-              <a:rPr lang="en-US" dirty="0" smtClean="0"/>
-              <a:t>your Concerns</a:t>
+              <a:t>Separate your Concerns</a:t>
             </a:r>
           </a:p>
           <a:p>
@@ -8751,6 +8749,182 @@
     <p:extLst>
       <p:ext uri="{BB962C8B-B14F-4D97-AF65-F5344CB8AC3E}">
         <p14:creationId xmlns:p14="http://schemas.microsoft.com/office/powerpoint/2010/main" val="866117104"/>
+      </p:ext>
+    </p:extLst>
+  </p:cSld>
+  <p:clrMapOvr>
+    <a:masterClrMapping/>
+  </p:clrMapOvr>
+  <p:timing>
+    <p:tnLst>
+      <p:par>
+        <p:cTn id="1" dur="indefinite" restart="never" nodeType="tmRoot"/>
+      </p:par>
+    </p:tnLst>
+  </p:timing>
+</p:sld>
+</file>
+
+<file path=ppt/slides/slide5.xml><?xml version="1.0" encoding="utf-8"?>
+<p:sld xmlns:a="http://schemas.openxmlformats.org/drawingml/2006/main" xmlns:r="http://schemas.openxmlformats.org/officeDocument/2006/relationships" xmlns:p="http://schemas.openxmlformats.org/presentationml/2006/main">
+  <p:cSld>
+    <p:spTree>
+      <p:nvGrpSpPr>
+        <p:cNvPr id="1" name=""/>
+        <p:cNvGrpSpPr/>
+        <p:nvPr/>
+      </p:nvGrpSpPr>
+      <p:grpSpPr>
+        <a:xfrm>
+          <a:off x="0" y="0"/>
+          <a:ext cx="0" cy="0"/>
+          <a:chOff x="0" y="0"/>
+          <a:chExt cx="0" cy="0"/>
+        </a:xfrm>
+      </p:grpSpPr>
+      <p:sp>
+        <p:nvSpPr>
+          <p:cNvPr id="2" name="Title 1"/>
+          <p:cNvSpPr>
+            <a:spLocks noGrp="1"/>
+          </p:cNvSpPr>
+          <p:nvPr>
+            <p:ph type="title"/>
+          </p:nvPr>
+        </p:nvSpPr>
+        <p:spPr>
+          <a:xfrm>
+            <a:off x="2167922" y="0"/>
+            <a:ext cx="8911687" cy="1378039"/>
+          </a:xfrm>
+        </p:spPr>
+        <p:txBody>
+          <a:bodyPr>
+            <a:normAutofit/>
+          </a:bodyPr>
+          <a:lstStyle/>
+          <a:p>
+            <a:r>
+              <a:rPr lang="en-US" dirty="0" smtClean="0"/>
+              <a:t>Introduction</a:t>
+            </a:r>
+            <a:br>
+              <a:rPr lang="en-US" dirty="0" smtClean="0"/>
+            </a:br>
+            <a:r>
+              <a:rPr lang="en-US" dirty="0" smtClean="0"/>
+              <a:t>              - </a:t>
+            </a:r>
+            <a:r>
+              <a:rPr lang="en-US" sz="2800" dirty="0" smtClean="0"/>
+              <a:t>Modules</a:t>
+            </a:r>
+            <a:endParaRPr lang="en-US" sz="2800" dirty="0"/>
+          </a:p>
+        </p:txBody>
+      </p:sp>
+      <p:sp>
+        <p:nvSpPr>
+          <p:cNvPr id="3" name="Content Placeholder 2"/>
+          <p:cNvSpPr>
+            <a:spLocks noGrp="1"/>
+          </p:cNvSpPr>
+          <p:nvPr>
+            <p:ph idx="1"/>
+          </p:nvPr>
+        </p:nvSpPr>
+        <p:spPr>
+          <a:xfrm>
+            <a:off x="2283832" y="1378039"/>
+            <a:ext cx="8915400" cy="3777622"/>
+          </a:xfrm>
+        </p:spPr>
+        <p:txBody>
+          <a:bodyPr>
+            <a:normAutofit/>
+          </a:bodyPr>
+          <a:lstStyle/>
+          <a:p>
+            <a:r>
+              <a:rPr lang="en-US" dirty="0" smtClean="0"/>
+              <a:t>Modules are AngularJS’s way of packaging relevant code under a single name.</a:t>
+            </a:r>
+            <a:endParaRPr lang="en-US" dirty="0" smtClean="0"/>
+          </a:p>
+          <a:p>
+            <a:r>
+              <a:rPr lang="en-US" dirty="0" smtClean="0"/>
+              <a:t>AngularJS module has the following 2 parts : </a:t>
+            </a:r>
+          </a:p>
+          <a:p>
+            <a:pPr marL="800100" lvl="1" indent="-342900">
+              <a:buFont typeface="+mj-lt"/>
+              <a:buAutoNum type="arabicPeriod"/>
+            </a:pPr>
+            <a:r>
+              <a:rPr lang="en-US" dirty="0" smtClean="0"/>
+              <a:t>It has its own controllers, services, factories, and directives;</a:t>
+            </a:r>
+          </a:p>
+          <a:p>
+            <a:pPr marL="800100" lvl="1" indent="-342900">
+              <a:buFont typeface="+mj-lt"/>
+              <a:buAutoNum type="arabicPeriod"/>
+            </a:pPr>
+            <a:r>
+              <a:rPr lang="en-US" dirty="0" smtClean="0"/>
+              <a:t>It can depend on other modules – </a:t>
+            </a:r>
+            <a:r>
+              <a:rPr lang="en-US" dirty="0" err="1" smtClean="0"/>
+              <a:t>depencies</a:t>
+            </a:r>
+            <a:r>
+              <a:rPr lang="en-US" dirty="0" smtClean="0"/>
+              <a:t>, defined when module is instantiated.</a:t>
+            </a:r>
+          </a:p>
+          <a:p>
+            <a:pPr marL="800100" lvl="1" indent="-342900">
+              <a:buFont typeface="+mj-lt"/>
+              <a:buAutoNum type="arabicPeriod"/>
+            </a:pPr>
+            <a:endParaRPr lang="en-US" dirty="0"/>
+          </a:p>
+          <a:p>
+            <a:pPr marL="457200" lvl="1" indent="0">
+              <a:buNone/>
+            </a:pPr>
+            <a:r>
+              <a:rPr lang="en-US" dirty="0" smtClean="0"/>
+              <a:t>-- </a:t>
+            </a:r>
+            <a:r>
+              <a:rPr lang="en-US" dirty="0" err="1" smtClean="0"/>
+              <a:t>git</a:t>
+            </a:r>
+            <a:r>
+              <a:rPr lang="en-US" smtClean="0"/>
+              <a:t> checkout module02</a:t>
+            </a:r>
+            <a:endParaRPr lang="en-US" dirty="0" smtClean="0"/>
+          </a:p>
+          <a:p>
+            <a:endParaRPr lang="en-US" dirty="0" smtClean="0"/>
+          </a:p>
+          <a:p>
+            <a:pPr marL="0" indent="0">
+              <a:buNone/>
+            </a:pPr>
+            <a:endParaRPr lang="en-US" u="sng" dirty="0"/>
+          </a:p>
+        </p:txBody>
+      </p:sp>
+    </p:spTree>
+    <p:extLst>
+      <p:ext uri="{BB962C8B-B14F-4D97-AF65-F5344CB8AC3E}">
+        <p14:creationId xmlns:p14="http://schemas.microsoft.com/office/powerpoint/2010/main" val="3142737489"/>
       </p:ext>
     </p:extLst>
   </p:cSld>

</xml_diff>

<commit_message>
added controller section in the ppt
</commit_message>
<xml_diff>
--- a/AngularJS.pptx
+++ b/AngularJS.pptx
@@ -10,6 +10,7 @@
     <p:sldId id="258" r:id="rId4"/>
     <p:sldId id="259" r:id="rId5"/>
     <p:sldId id="260" r:id="rId6"/>
+    <p:sldId id="261" r:id="rId7"/>
   </p:sldIdLst>
   <p:sldSz cx="12192000" cy="6858000"/>
   <p:notesSz cx="6858000" cy="9144000"/>
@@ -122,6 +123,7 @@
             <p14:sldId id="258"/>
             <p14:sldId id="259"/>
             <p14:sldId id="260"/>
+            <p14:sldId id="261"/>
           </p14:sldIdLst>
         </p14:section>
       </p14:sectionLst>
@@ -8849,7 +8851,6 @@
               <a:rPr lang="en-US" dirty="0" smtClean="0"/>
               <a:t>Modules are AngularJS’s way of packaging relevant code under a single name.</a:t>
             </a:r>
-            <a:endParaRPr lang="en-US" dirty="0" smtClean="0"/>
           </a:p>
           <a:p>
             <a:r>
@@ -8901,14 +8902,13 @@
               <a:t>-- </a:t>
             </a:r>
             <a:r>
-              <a:rPr lang="en-US" dirty="0" err="1" smtClean="0"/>
+              <a:rPr lang="en-US" b="1" dirty="0" err="1" smtClean="0"/>
               <a:t>git</a:t>
             </a:r>
             <a:r>
-              <a:rPr lang="en-US" smtClean="0"/>
+              <a:rPr lang="en-US" b="1" dirty="0" smtClean="0"/>
               <a:t> checkout module02</a:t>
             </a:r>
-            <a:endParaRPr lang="en-US" dirty="0" smtClean="0"/>
           </a:p>
           <a:p>
             <a:endParaRPr lang="en-US" dirty="0" smtClean="0"/>
@@ -8925,6 +8925,173 @@
     <p:extLst>
       <p:ext uri="{BB962C8B-B14F-4D97-AF65-F5344CB8AC3E}">
         <p14:creationId xmlns:p14="http://schemas.microsoft.com/office/powerpoint/2010/main" val="3142737489"/>
+      </p:ext>
+    </p:extLst>
+  </p:cSld>
+  <p:clrMapOvr>
+    <a:masterClrMapping/>
+  </p:clrMapOvr>
+  <p:timing>
+    <p:tnLst>
+      <p:par>
+        <p:cTn id="1" dur="indefinite" restart="never" nodeType="tmRoot"/>
+      </p:par>
+    </p:tnLst>
+  </p:timing>
+</p:sld>
+</file>
+
+<file path=ppt/slides/slide6.xml><?xml version="1.0" encoding="utf-8"?>
+<p:sld xmlns:a="http://schemas.openxmlformats.org/drawingml/2006/main" xmlns:r="http://schemas.openxmlformats.org/officeDocument/2006/relationships" xmlns:p="http://schemas.openxmlformats.org/presentationml/2006/main">
+  <p:cSld>
+    <p:spTree>
+      <p:nvGrpSpPr>
+        <p:cNvPr id="1" name=""/>
+        <p:cNvGrpSpPr/>
+        <p:nvPr/>
+      </p:nvGrpSpPr>
+      <p:grpSpPr>
+        <a:xfrm>
+          <a:off x="0" y="0"/>
+          <a:ext cx="0" cy="0"/>
+          <a:chOff x="0" y="0"/>
+          <a:chExt cx="0" cy="0"/>
+        </a:xfrm>
+      </p:grpSpPr>
+      <p:sp>
+        <p:nvSpPr>
+          <p:cNvPr id="2" name="Title 1"/>
+          <p:cNvSpPr>
+            <a:spLocks noGrp="1"/>
+          </p:cNvSpPr>
+          <p:nvPr>
+            <p:ph type="title"/>
+          </p:nvPr>
+        </p:nvSpPr>
+        <p:spPr>
+          <a:xfrm>
+            <a:off x="2167922" y="0"/>
+            <a:ext cx="8911687" cy="1378039"/>
+          </a:xfrm>
+        </p:spPr>
+        <p:txBody>
+          <a:bodyPr>
+            <a:normAutofit/>
+          </a:bodyPr>
+          <a:lstStyle/>
+          <a:p>
+            <a:r>
+              <a:rPr lang="en-US" dirty="0" smtClean="0"/>
+              <a:t>Introduction</a:t>
+            </a:r>
+            <a:br>
+              <a:rPr lang="en-US" dirty="0" smtClean="0"/>
+            </a:br>
+            <a:r>
+              <a:rPr lang="en-US" dirty="0" smtClean="0"/>
+              <a:t>              - </a:t>
+            </a:r>
+            <a:r>
+              <a:rPr lang="en-US" sz="2800" dirty="0" smtClean="0"/>
+              <a:t>Controllers</a:t>
+            </a:r>
+            <a:endParaRPr lang="en-US" sz="2800" dirty="0"/>
+          </a:p>
+        </p:txBody>
+      </p:sp>
+      <p:sp>
+        <p:nvSpPr>
+          <p:cNvPr id="3" name="Content Placeholder 2"/>
+          <p:cNvSpPr>
+            <a:spLocks noGrp="1"/>
+          </p:cNvSpPr>
+          <p:nvPr>
+            <p:ph idx="1"/>
+          </p:nvPr>
+        </p:nvSpPr>
+        <p:spPr>
+          <a:xfrm>
+            <a:off x="2283832" y="1378039"/>
+            <a:ext cx="8915400" cy="3777622"/>
+          </a:xfrm>
+        </p:spPr>
+        <p:txBody>
+          <a:bodyPr>
+            <a:normAutofit/>
+          </a:bodyPr>
+          <a:lstStyle/>
+          <a:p>
+            <a:r>
+              <a:rPr lang="en-US" dirty="0" smtClean="0"/>
+              <a:t>This is the JS function which perform the majority of UI-oriented work.</a:t>
+            </a:r>
+            <a:endParaRPr lang="en-US" dirty="0" smtClean="0"/>
+          </a:p>
+          <a:p>
+            <a:r>
+              <a:rPr lang="en-US" dirty="0" smtClean="0"/>
+              <a:t>We wil</a:t>
+            </a:r>
+            <a:r>
+              <a:rPr lang="en-US" dirty="0" smtClean="0"/>
+              <a:t>l never have a controller that is not used in the UI</a:t>
+            </a:r>
+          </a:p>
+          <a:p>
+            <a:r>
+              <a:rPr lang="en-US" dirty="0" smtClean="0"/>
+              <a:t>Acts as </a:t>
+            </a:r>
+            <a:r>
+              <a:rPr lang="en-US" smtClean="0"/>
+              <a:t>a gateway b/w model and view</a:t>
+            </a:r>
+            <a:endParaRPr lang="en-US" dirty="0" smtClean="0"/>
+          </a:p>
+          <a:p>
+            <a:pPr marL="800100" lvl="1" indent="-342900">
+              <a:buFont typeface="+mj-lt"/>
+              <a:buAutoNum type="arabicPeriod"/>
+            </a:pPr>
+            <a:endParaRPr lang="en-US" dirty="0"/>
+          </a:p>
+          <a:p>
+            <a:pPr marL="457200" lvl="1" indent="0">
+              <a:buNone/>
+            </a:pPr>
+            <a:r>
+              <a:rPr lang="en-US" dirty="0" smtClean="0"/>
+              <a:t>-- </a:t>
+            </a:r>
+            <a:r>
+              <a:rPr lang="en-US" b="1" dirty="0" err="1" smtClean="0"/>
+              <a:t>git</a:t>
+            </a:r>
+            <a:r>
+              <a:rPr lang="en-US" b="1" dirty="0" smtClean="0"/>
+              <a:t> checkout </a:t>
+            </a:r>
+            <a:r>
+              <a:rPr lang="en-US" b="1" dirty="0" smtClean="0"/>
+              <a:t>module03</a:t>
+            </a:r>
+            <a:endParaRPr lang="en-US" b="1" dirty="0" smtClean="0"/>
+          </a:p>
+          <a:p>
+            <a:endParaRPr lang="en-US" dirty="0" smtClean="0"/>
+          </a:p>
+          <a:p>
+            <a:pPr marL="0" indent="0">
+              <a:buNone/>
+            </a:pPr>
+            <a:endParaRPr lang="en-US" u="sng" dirty="0"/>
+          </a:p>
+        </p:txBody>
+      </p:sp>
+    </p:spTree>
+    <p:extLst>
+      <p:ext uri="{BB962C8B-B14F-4D97-AF65-F5344CB8AC3E}">
+        <p14:creationId xmlns:p14="http://schemas.microsoft.com/office/powerpoint/2010/main" val="1519361733"/>
       </p:ext>
     </p:extLst>
   </p:cSld>

</xml_diff>

<commit_message>
added angularjs workflow steps
</commit_message>
<xml_diff>
--- a/AngularJS.pptx
+++ b/AngularJS.pptx
@@ -11,6 +11,7 @@
     <p:sldId id="259" r:id="rId5"/>
     <p:sldId id="260" r:id="rId6"/>
     <p:sldId id="261" r:id="rId7"/>
+    <p:sldId id="262" r:id="rId8"/>
   </p:sldIdLst>
   <p:sldSz cx="12192000" cy="6858000"/>
   <p:notesSz cx="6858000" cy="9144000"/>
@@ -124,6 +125,7 @@
             <p14:sldId id="259"/>
             <p14:sldId id="260"/>
             <p14:sldId id="261"/>
+            <p14:sldId id="262"/>
           </p14:sldIdLst>
         </p14:section>
       </p14:sectionLst>
@@ -9025,16 +9027,11 @@
               <a:rPr lang="en-US" dirty="0" smtClean="0"/>
               <a:t>This is the JS function which perform the majority of UI-oriented work.</a:t>
             </a:r>
-            <a:endParaRPr lang="en-US" dirty="0" smtClean="0"/>
           </a:p>
           <a:p>
             <a:r>
               <a:rPr lang="en-US" dirty="0" smtClean="0"/>
-              <a:t>We wil</a:t>
-            </a:r>
-            <a:r>
-              <a:rPr lang="en-US" dirty="0" smtClean="0"/>
-              <a:t>l never have a controller that is not used in the UI</a:t>
+              <a:t>We will never have a controller that is not used in the UI</a:t>
             </a:r>
           </a:p>
           <a:p>
@@ -9069,13 +9066,8 @@
             </a:r>
             <a:r>
               <a:rPr lang="en-US" b="1" dirty="0" smtClean="0"/>
-              <a:t> checkout </a:t>
-            </a:r>
-            <a:r>
-              <a:rPr lang="en-US" b="1" dirty="0" smtClean="0"/>
-              <a:t>module03</a:t>
-            </a:r>
-            <a:endParaRPr lang="en-US" b="1" dirty="0" smtClean="0"/>
+              <a:t> checkout module03</a:t>
+            </a:r>
           </a:p>
           <a:p>
             <a:endParaRPr lang="en-US" dirty="0" smtClean="0"/>
@@ -9092,6 +9084,200 @@
     <p:extLst>
       <p:ext uri="{BB962C8B-B14F-4D97-AF65-F5344CB8AC3E}">
         <p14:creationId xmlns:p14="http://schemas.microsoft.com/office/powerpoint/2010/main" val="1519361733"/>
+      </p:ext>
+    </p:extLst>
+  </p:cSld>
+  <p:clrMapOvr>
+    <a:masterClrMapping/>
+  </p:clrMapOvr>
+  <p:timing>
+    <p:tnLst>
+      <p:par>
+        <p:cTn id="1" dur="indefinite" restart="never" nodeType="tmRoot"/>
+      </p:par>
+    </p:tnLst>
+  </p:timing>
+</p:sld>
+</file>
+
+<file path=ppt/slides/slide7.xml><?xml version="1.0" encoding="utf-8"?>
+<p:sld xmlns:a="http://schemas.openxmlformats.org/drawingml/2006/main" xmlns:r="http://schemas.openxmlformats.org/officeDocument/2006/relationships" xmlns:p="http://schemas.openxmlformats.org/presentationml/2006/main">
+  <p:cSld>
+    <p:spTree>
+      <p:nvGrpSpPr>
+        <p:cNvPr id="1" name=""/>
+        <p:cNvGrpSpPr/>
+        <p:nvPr/>
+      </p:nvGrpSpPr>
+      <p:grpSpPr>
+        <a:xfrm>
+          <a:off x="0" y="0"/>
+          <a:ext cx="0" cy="0"/>
+          <a:chOff x="0" y="0"/>
+          <a:chExt cx="0" cy="0"/>
+        </a:xfrm>
+      </p:grpSpPr>
+      <p:sp>
+        <p:nvSpPr>
+          <p:cNvPr id="2" name="Title 1"/>
+          <p:cNvSpPr>
+            <a:spLocks noGrp="1"/>
+          </p:cNvSpPr>
+          <p:nvPr>
+            <p:ph type="title"/>
+          </p:nvPr>
+        </p:nvSpPr>
+        <p:spPr>
+          <a:xfrm>
+            <a:off x="2167922" y="0"/>
+            <a:ext cx="8911687" cy="631065"/>
+          </a:xfrm>
+        </p:spPr>
+        <p:txBody>
+          <a:bodyPr>
+            <a:normAutofit fontScale="90000"/>
+          </a:bodyPr>
+          <a:lstStyle/>
+          <a:p>
+            <a:r>
+              <a:rPr lang="en-US" dirty="0" smtClean="0"/>
+              <a:t>Steps of </a:t>
+            </a:r>
+            <a:r>
+              <a:rPr lang="en-US" dirty="0"/>
+              <a:t>A</a:t>
+            </a:r>
+            <a:r>
+              <a:rPr lang="en-US" dirty="0" smtClean="0"/>
+              <a:t>ngularJS App Initialization</a:t>
+            </a:r>
+            <a:endParaRPr lang="en-US" sz="2800" dirty="0"/>
+          </a:p>
+        </p:txBody>
+      </p:sp>
+      <p:sp>
+        <p:nvSpPr>
+          <p:cNvPr id="3" name="Content Placeholder 2"/>
+          <p:cNvSpPr>
+            <a:spLocks noGrp="1"/>
+          </p:cNvSpPr>
+          <p:nvPr>
+            <p:ph idx="1"/>
+          </p:nvPr>
+        </p:nvSpPr>
+        <p:spPr>
+          <a:xfrm>
+            <a:off x="2283832" y="1378039"/>
+            <a:ext cx="8915400" cy="4829578"/>
+          </a:xfrm>
+        </p:spPr>
+        <p:txBody>
+          <a:bodyPr>
+            <a:normAutofit fontScale="92500"/>
+          </a:bodyPr>
+          <a:lstStyle/>
+          <a:p>
+            <a:pPr>
+              <a:buFont typeface="+mj-lt"/>
+              <a:buAutoNum type="arabicPeriod"/>
+            </a:pPr>
+            <a:r>
+              <a:rPr lang="en-US" dirty="0"/>
+              <a:t>The HTML is loaded. This triggers requests for all the scripts that are a part of it</a:t>
+            </a:r>
+            <a:r>
+              <a:rPr lang="en-US" dirty="0" smtClean="0"/>
+              <a:t>.</a:t>
+            </a:r>
+          </a:p>
+          <a:p>
+            <a:pPr>
+              <a:buFont typeface="+mj-lt"/>
+              <a:buAutoNum type="arabicPeriod"/>
+            </a:pPr>
+            <a:r>
+              <a:rPr lang="en-US" dirty="0" smtClean="0"/>
+              <a:t>After the entire document is loaded, AngularJS kicks in and looks for ng-app directive.</a:t>
+            </a:r>
+          </a:p>
+          <a:p>
+            <a:pPr>
+              <a:buFont typeface="+mj-lt"/>
+              <a:buAutoNum type="arabicPeriod"/>
+            </a:pPr>
+            <a:r>
+              <a:rPr lang="en-US" dirty="0" smtClean="0"/>
+              <a:t>When it finds the ng-app directive, it looks for and loads the module that is specified and attaches it to the element,</a:t>
+            </a:r>
+          </a:p>
+          <a:p>
+            <a:pPr>
+              <a:buFont typeface="+mj-lt"/>
+              <a:buAutoNum type="arabicPeriod"/>
+            </a:pPr>
+            <a:r>
+              <a:rPr lang="en-US" dirty="0" smtClean="0"/>
+              <a:t>AngularJS traverses the children DOM elements of the root element with the ng-app and starts looking for directives and bind statements,</a:t>
+            </a:r>
+          </a:p>
+          <a:p>
+            <a:pPr>
+              <a:buFont typeface="+mj-lt"/>
+              <a:buAutoNum type="arabicPeriod"/>
+            </a:pPr>
+            <a:r>
+              <a:rPr lang="en-US" dirty="0" smtClean="0"/>
+              <a:t>Each time it hits and ng-controller or an ng-repeat, it creates what is called a scope in AngularJS.</a:t>
+            </a:r>
+          </a:p>
+          <a:p>
+            <a:pPr>
+              <a:buFont typeface="+mj-lt"/>
+              <a:buAutoNum type="arabicPeriod"/>
+            </a:pPr>
+            <a:r>
+              <a:rPr lang="en-US" dirty="0" smtClean="0"/>
+              <a:t>AngularJS then adds watchers and listeners on the variable that the HTML accesses, and keeps track of the current value of each of them. When that value changes, Angular updates the UI immediately.</a:t>
+            </a:r>
+          </a:p>
+          <a:p>
+            <a:pPr>
+              <a:buFont typeface="+mj-lt"/>
+              <a:buAutoNum type="arabicPeriod"/>
+            </a:pPr>
+            <a:r>
+              <a:rPr lang="en-US" dirty="0" smtClean="0"/>
+              <a:t>Instead of polling to check if the data has changed, AngularJS optimizes and checks for updates to the UI only on certain events, which can cause a change in data or the model underneath. </a:t>
+            </a:r>
+            <a:r>
+              <a:rPr lang="en-US" dirty="0" err="1" smtClean="0"/>
+              <a:t>Eg</a:t>
+            </a:r>
+            <a:r>
+              <a:rPr lang="en-US" dirty="0" smtClean="0"/>
+              <a:t>: XHR, page loads, user interactions</a:t>
+            </a:r>
+            <a:endParaRPr lang="en-US" dirty="0"/>
+          </a:p>
+          <a:p>
+            <a:pPr>
+              <a:buFont typeface="+mj-lt"/>
+              <a:buAutoNum type="arabicPeriod"/>
+            </a:pPr>
+            <a:endParaRPr lang="en-US" dirty="0" smtClean="0"/>
+          </a:p>
+          <a:p>
+            <a:pPr marL="0" indent="0">
+              <a:buNone/>
+            </a:pPr>
+            <a:endParaRPr lang="en-US" u="sng" dirty="0"/>
+          </a:p>
+        </p:txBody>
+      </p:sp>
+    </p:spTree>
+    <p:extLst>
+      <p:ext uri="{BB962C8B-B14F-4D97-AF65-F5344CB8AC3E}">
+        <p14:creationId xmlns:p14="http://schemas.microsoft.com/office/powerpoint/2010/main" val="789602053"/>
       </p:ext>
     </p:extLst>
   </p:cSld>

</xml_diff>